<commit_message>
update Lecture 5 materials
</commit_message>
<xml_diff>
--- a/Lecture09_Identification/Lecture09_NonlinearModels_2022F.pptx
+++ b/Lecture09_Identification/Lecture09_NonlinearModels_2022F.pptx
@@ -280,7 +280,7 @@
           <a:p>
             <a:fld id="{EF911157-0FC2-4F06-8D61-FD647FE4E19D}" type="datetimeFigureOut">
               <a:rPr lang="en-US" smtClean="0"/>
-              <a:t>4/29/2024</a:t>
+              <a:t>8/6/2024</a:t>
             </a:fld>
             <a:endParaRPr lang="en-US"/>
           </a:p>
@@ -612,16 +612,13 @@
             </a:pPr>
             <a:r>
               <a:rPr lang="en-US" dirty="0"/>
-              <a:t>Take out hurdle models, </a:t>
-            </a:r>
-            <a:r>
-              <a:rPr lang="en-US" dirty="0" err="1"/>
-              <a:t>heckit</a:t>
-            </a:r>
-            <a:r>
-              <a:rPr lang="en-US" dirty="0"/>
-              <a:t>, multinomial logit</a:t>
-            </a:r>
+              <a:t>When discussing identification, </a:t>
+            </a:r>
+            <a:r>
+              <a:rPr lang="en-US"/>
+              <a:t>use slides here: https://davidcard.berkeley.edu/lectures/woytinsky.pdf</a:t>
+            </a:r>
+            <a:endParaRPr lang="en-US" dirty="0"/>
           </a:p>
           <a:p>
             <a:pPr marL="171450" indent="-171450">
@@ -630,6 +627,24 @@
             </a:pPr>
             <a:r>
               <a:rPr lang="en-US" dirty="0"/>
+              <a:t>Take out hurdle models, </a:t>
+            </a:r>
+            <a:r>
+              <a:rPr lang="en-US" dirty="0" err="1"/>
+              <a:t>heckit</a:t>
+            </a:r>
+            <a:r>
+              <a:rPr lang="en-US" dirty="0"/>
+              <a:t>, multinomial logit</a:t>
+            </a:r>
+          </a:p>
+          <a:p>
+            <a:pPr marL="171450" indent="-171450">
+              <a:buFont typeface="Arial" panose="020B0604020202020204" pitchFamily="34" charset="0"/>
+              <a:buChar char="•"/>
+            </a:pPr>
+            <a:r>
+              <a:rPr lang="en-US" dirty="0"/>
               <a:t>Add in discussion about identification + partial identification + </a:t>
             </a:r>
             <a:r>
@@ -637,10 +652,9 @@
               <a:t>oster</a:t>
             </a:r>
             <a:r>
-              <a:rPr lang="en-US"/>
+              <a:rPr lang="en-US" dirty="0"/>
               <a:t> bounds</a:t>
             </a:r>
-            <a:endParaRPr lang="en-US" dirty="0"/>
           </a:p>
         </p:txBody>
       </p:sp>
@@ -7232,7 +7246,7 @@
             <a:fld id="{0972D05C-DCFB-4BB6-B49C-AC126BF3ED2C}" type="datetimeFigureOut">
               <a:rPr lang="en-US" smtClean="0"/>
               <a:pPr/>
-              <a:t>4/29/2024</a:t>
+              <a:t>8/6/2024</a:t>
             </a:fld>
             <a:endParaRPr lang="en-US"/>
           </a:p>
@@ -7462,7 +7476,7 @@
             <a:fld id="{0972D05C-DCFB-4BB6-B49C-AC126BF3ED2C}" type="datetimeFigureOut">
               <a:rPr lang="en-US" smtClean="0"/>
               <a:pPr/>
-              <a:t>4/29/2024</a:t>
+              <a:t>8/6/2024</a:t>
             </a:fld>
             <a:endParaRPr lang="en-US"/>
           </a:p>
@@ -7644,7 +7658,7 @@
             <a:fld id="{0972D05C-DCFB-4BB6-B49C-AC126BF3ED2C}" type="datetimeFigureOut">
               <a:rPr lang="en-US" smtClean="0"/>
               <a:pPr/>
-              <a:t>4/29/2024</a:t>
+              <a:t>8/6/2024</a:t>
             </a:fld>
             <a:endParaRPr lang="en-US"/>
           </a:p>
@@ -7816,7 +7830,7 @@
             <a:fld id="{0972D05C-DCFB-4BB6-B49C-AC126BF3ED2C}" type="datetimeFigureOut">
               <a:rPr lang="en-US" smtClean="0"/>
               <a:pPr/>
-              <a:t>4/29/2024</a:t>
+              <a:t>8/6/2024</a:t>
             </a:fld>
             <a:endParaRPr lang="en-US"/>
           </a:p>
@@ -8072,7 +8086,7 @@
             <a:fld id="{0972D05C-DCFB-4BB6-B49C-AC126BF3ED2C}" type="datetimeFigureOut">
               <a:rPr lang="en-US" smtClean="0"/>
               <a:pPr/>
-              <a:t>4/29/2024</a:t>
+              <a:t>8/6/2024</a:t>
             </a:fld>
             <a:endParaRPr lang="en-US"/>
           </a:p>
@@ -8400,7 +8414,7 @@
             <a:fld id="{0972D05C-DCFB-4BB6-B49C-AC126BF3ED2C}" type="datetimeFigureOut">
               <a:rPr lang="en-US" smtClean="0"/>
               <a:pPr/>
-              <a:t>4/29/2024</a:t>
+              <a:t>8/6/2024</a:t>
             </a:fld>
             <a:endParaRPr lang="en-US"/>
           </a:p>
@@ -8853,7 +8867,7 @@
             <a:fld id="{0972D05C-DCFB-4BB6-B49C-AC126BF3ED2C}" type="datetimeFigureOut">
               <a:rPr lang="en-US" smtClean="0"/>
               <a:pPr/>
-              <a:t>4/29/2024</a:t>
+              <a:t>8/6/2024</a:t>
             </a:fld>
             <a:endParaRPr lang="en-US"/>
           </a:p>
@@ -8973,7 +8987,7 @@
             <a:fld id="{0972D05C-DCFB-4BB6-B49C-AC126BF3ED2C}" type="datetimeFigureOut">
               <a:rPr lang="en-US" smtClean="0"/>
               <a:pPr/>
-              <a:t>4/29/2024</a:t>
+              <a:t>8/6/2024</a:t>
             </a:fld>
             <a:endParaRPr lang="en-US"/>
           </a:p>
@@ -9070,7 +9084,7 @@
             <a:fld id="{0972D05C-DCFB-4BB6-B49C-AC126BF3ED2C}" type="datetimeFigureOut">
               <a:rPr lang="en-US" smtClean="0"/>
               <a:pPr/>
-              <a:t>4/29/2024</a:t>
+              <a:t>8/6/2024</a:t>
             </a:fld>
             <a:endParaRPr lang="en-US"/>
           </a:p>
@@ -9359,7 +9373,7 @@
             <a:fld id="{0972D05C-DCFB-4BB6-B49C-AC126BF3ED2C}" type="datetimeFigureOut">
               <a:rPr lang="en-US" smtClean="0"/>
               <a:pPr/>
-              <a:t>4/29/2024</a:t>
+              <a:t>8/6/2024</a:t>
             </a:fld>
             <a:endParaRPr lang="en-US"/>
           </a:p>
@@ -9683,7 +9697,7 @@
             <a:fld id="{0972D05C-DCFB-4BB6-B49C-AC126BF3ED2C}" type="datetimeFigureOut">
               <a:rPr lang="en-US" smtClean="0"/>
               <a:pPr/>
-              <a:t>4/29/2024</a:t>
+              <a:t>8/6/2024</a:t>
             </a:fld>
             <a:endParaRPr lang="en-US"/>
           </a:p>
@@ -9938,7 +9952,7 @@
             <a:fld id="{0972D05C-DCFB-4BB6-B49C-AC126BF3ED2C}" type="datetimeFigureOut">
               <a:rPr lang="en-US" smtClean="0"/>
               <a:pPr/>
-              <a:t>4/29/2024</a:t>
+              <a:t>8/6/2024</a:t>
             </a:fld>
             <a:endParaRPr lang="en-US" dirty="0"/>
           </a:p>

</xml_diff>